<commit_message>
updated ep1000 3dprinting with files
</commit_message>
<xml_diff>
--- a/presentations/ep1000_3dprinting/ep1000_3dprinting.pptx
+++ b/presentations/ep1000_3dprinting/ep1000_3dprinting.pptx
@@ -5,7 +5,7 @@
     <p:sldMasterId id="2147483660" r:id="rId1"/>
   </p:sldMasterIdLst>
   <p:notesMasterIdLst>
-    <p:notesMasterId r:id="rId27"/>
+    <p:notesMasterId r:id="rId28"/>
   </p:notesMasterIdLst>
   <p:sldIdLst>
     <p:sldId id="256" r:id="rId2"/>
@@ -32,7 +32,8 @@
     <p:sldId id="280" r:id="rId23"/>
     <p:sldId id="278" r:id="rId24"/>
     <p:sldId id="281" r:id="rId25"/>
-    <p:sldId id="259" r:id="rId26"/>
+    <p:sldId id="283" r:id="rId26"/>
+    <p:sldId id="259" r:id="rId27"/>
   </p:sldIdLst>
   <p:sldSz cx="9144000" cy="6858000" type="screen4x3"/>
   <p:notesSz cx="6858000" cy="9144000"/>
@@ -828,7 +829,7 @@
           <a:p>
             <a:fld id="{FD14D038-41FE-4749-9D1B-B8F8368A89DF}" type="slidenum">
               <a:rPr lang="en-US" smtClean="0"/>
-              <a:t>25</a:t>
+              <a:t>26</a:t>
             </a:fld>
             <a:endParaRPr lang="en-US"/>
           </a:p>
@@ -7582,6 +7583,227 @@
 </file>
 
 <file path=ppt/slides/slide25.xml><?xml version="1.0" encoding="utf-8"?>
+<p:sld xmlns:a="http://schemas.openxmlformats.org/drawingml/2006/main" xmlns:r="http://schemas.openxmlformats.org/officeDocument/2006/relationships" xmlns:p="http://schemas.openxmlformats.org/presentationml/2006/main">
+  <p:cSld>
+    <p:spTree>
+      <p:nvGrpSpPr>
+        <p:cNvPr id="1" name=""/>
+        <p:cNvGrpSpPr/>
+        <p:nvPr/>
+      </p:nvGrpSpPr>
+      <p:grpSpPr>
+        <a:xfrm>
+          <a:off x="0" y="0"/>
+          <a:ext cx="0" cy="0"/>
+          <a:chOff x="0" y="0"/>
+          <a:chExt cx="0" cy="0"/>
+        </a:xfrm>
+      </p:grpSpPr>
+      <p:sp>
+        <p:nvSpPr>
+          <p:cNvPr id="2" name="Title 1">
+            <a:extLst>
+              <a:ext uri="{FF2B5EF4-FFF2-40B4-BE49-F238E27FC236}">
+                <a16:creationId xmlns:a16="http://schemas.microsoft.com/office/drawing/2014/main" id="{0764640C-9C7B-4768-91B2-32AF8F686D09}"/>
+              </a:ext>
+            </a:extLst>
+          </p:cNvPr>
+          <p:cNvSpPr>
+            <a:spLocks noGrp="1"/>
+          </p:cNvSpPr>
+          <p:nvPr>
+            <p:ph type="title"/>
+          </p:nvPr>
+        </p:nvSpPr>
+        <p:spPr>
+          <a:xfrm>
+            <a:off x="4097866" y="365126"/>
+            <a:ext cx="4417483" cy="1325563"/>
+          </a:xfrm>
+        </p:spPr>
+        <p:txBody>
+          <a:bodyPr/>
+          <a:lstStyle/>
+          <a:p>
+            <a:r>
+              <a:rPr lang="en-SG" dirty="0"/>
+              <a:t>Knight: Print</a:t>
+            </a:r>
+            <a:endParaRPr lang="en-US" dirty="0"/>
+          </a:p>
+        </p:txBody>
+      </p:sp>
+      <p:sp>
+        <p:nvSpPr>
+          <p:cNvPr id="4" name="Slide Number Placeholder 3">
+            <a:extLst>
+              <a:ext uri="{FF2B5EF4-FFF2-40B4-BE49-F238E27FC236}">
+                <a16:creationId xmlns:a16="http://schemas.microsoft.com/office/drawing/2014/main" id="{DCF2DF5F-9F84-41D2-97FF-63527EAD666C}"/>
+              </a:ext>
+            </a:extLst>
+          </p:cNvPr>
+          <p:cNvSpPr>
+            <a:spLocks noGrp="1"/>
+          </p:cNvSpPr>
+          <p:nvPr>
+            <p:ph type="sldNum" sz="quarter" idx="12"/>
+          </p:nvPr>
+        </p:nvSpPr>
+        <p:spPr/>
+        <p:txBody>
+          <a:bodyPr/>
+          <a:lstStyle/>
+          <a:p>
+            <a:fld id="{CAB166B3-F268-4CEF-878A-CFB0D0D505D3}" type="slidenum">
+              <a:rPr lang="en-US" smtClean="0"/>
+              <a:t>25</a:t>
+            </a:fld>
+            <a:endParaRPr lang="en-US"/>
+          </a:p>
+        </p:txBody>
+      </p:sp>
+      <p:pic>
+        <p:nvPicPr>
+          <p:cNvPr id="6" name="Picture 5">
+            <a:extLst>
+              <a:ext uri="{FF2B5EF4-FFF2-40B4-BE49-F238E27FC236}">
+                <a16:creationId xmlns:a16="http://schemas.microsoft.com/office/drawing/2014/main" id="{E7094ECB-0B6E-41AF-A6D9-22E5D706726D}"/>
+              </a:ext>
+            </a:extLst>
+          </p:cNvPr>
+          <p:cNvPicPr>
+            <a:picLocks noChangeAspect="1"/>
+          </p:cNvPicPr>
+          <p:nvPr/>
+        </p:nvPicPr>
+        <p:blipFill>
+          <a:blip r:embed="rId2"/>
+          <a:stretch>
+            <a:fillRect/>
+          </a:stretch>
+        </p:blipFill>
+        <p:spPr>
+          <a:xfrm>
+            <a:off x="0" y="0"/>
+            <a:ext cx="4106008" cy="6858000"/>
+          </a:xfrm>
+          <a:prstGeom prst="rect">
+            <a:avLst/>
+          </a:prstGeom>
+        </p:spPr>
+      </p:pic>
+      <p:pic>
+        <p:nvPicPr>
+          <p:cNvPr id="10" name="Picture 9">
+            <a:extLst>
+              <a:ext uri="{FF2B5EF4-FFF2-40B4-BE49-F238E27FC236}">
+                <a16:creationId xmlns:a16="http://schemas.microsoft.com/office/drawing/2014/main" id="{CCCDEF3D-9240-4C93-BBD9-1542AB96017F}"/>
+              </a:ext>
+            </a:extLst>
+          </p:cNvPr>
+          <p:cNvPicPr>
+            <a:picLocks noChangeAspect="1"/>
+          </p:cNvPicPr>
+          <p:nvPr/>
+        </p:nvPicPr>
+        <p:blipFill>
+          <a:blip r:embed="rId3"/>
+          <a:stretch>
+            <a:fillRect/>
+          </a:stretch>
+        </p:blipFill>
+        <p:spPr>
+          <a:xfrm>
+            <a:off x="4331053" y="1527682"/>
+            <a:ext cx="2609850" cy="3086100"/>
+          </a:xfrm>
+          <a:prstGeom prst="rect">
+            <a:avLst/>
+          </a:prstGeom>
+        </p:spPr>
+      </p:pic>
+      <p:pic>
+        <p:nvPicPr>
+          <p:cNvPr id="12" name="Picture 11">
+            <a:extLst>
+              <a:ext uri="{FF2B5EF4-FFF2-40B4-BE49-F238E27FC236}">
+                <a16:creationId xmlns:a16="http://schemas.microsoft.com/office/drawing/2014/main" id="{F6C6B291-5F92-4D7C-8F65-8A52F276D40B}"/>
+              </a:ext>
+            </a:extLst>
+          </p:cNvPr>
+          <p:cNvPicPr>
+            <a:picLocks noChangeAspect="1"/>
+          </p:cNvPicPr>
+          <p:nvPr/>
+        </p:nvPicPr>
+        <p:blipFill>
+          <a:blip r:embed="rId4"/>
+          <a:stretch>
+            <a:fillRect/>
+          </a:stretch>
+        </p:blipFill>
+        <p:spPr>
+          <a:xfrm>
+            <a:off x="4331053" y="4726032"/>
+            <a:ext cx="3086100" cy="1266825"/>
+          </a:xfrm>
+          <a:prstGeom prst="rect">
+            <a:avLst/>
+          </a:prstGeom>
+        </p:spPr>
+      </p:pic>
+      <p:sp>
+        <p:nvSpPr>
+          <p:cNvPr id="13" name="TextBox 12">
+            <a:extLst>
+              <a:ext uri="{FF2B5EF4-FFF2-40B4-BE49-F238E27FC236}">
+                <a16:creationId xmlns:a16="http://schemas.microsoft.com/office/drawing/2014/main" id="{1D6FBB53-68F2-4BA8-BCC8-33A33A7664A4}"/>
+              </a:ext>
+            </a:extLst>
+          </p:cNvPr>
+          <p:cNvSpPr txBox="1"/>
+          <p:nvPr/>
+        </p:nvSpPr>
+        <p:spPr>
+          <a:xfrm>
+            <a:off x="4331053" y="5989938"/>
+            <a:ext cx="1676164" cy="369332"/>
+          </a:xfrm>
+          <a:prstGeom prst="rect">
+            <a:avLst/>
+          </a:prstGeom>
+          <a:noFill/>
+        </p:spPr>
+        <p:txBody>
+          <a:bodyPr wrap="none" rtlCol="0">
+            <a:spAutoFit/>
+          </a:bodyPr>
+          <a:lstStyle/>
+          <a:p>
+            <a:r>
+              <a:rPr lang="en-SG" dirty="0">
+                <a:hlinkClick r:id="rId5" action="ppaction://hlinkfile"/>
+              </a:rPr>
+              <a:t>Knight files (zip)</a:t>
+            </a:r>
+            <a:endParaRPr lang="en-US" dirty="0"/>
+          </a:p>
+        </p:txBody>
+      </p:sp>
+    </p:spTree>
+    <p:extLst>
+      <p:ext uri="{BB962C8B-B14F-4D97-AF65-F5344CB8AC3E}">
+        <p14:creationId xmlns:p14="http://schemas.microsoft.com/office/powerpoint/2010/main" val="1049955764"/>
+      </p:ext>
+    </p:extLst>
+  </p:cSld>
+  <p:clrMapOvr>
+    <a:masterClrMapping/>
+  </p:clrMapOvr>
+</p:sld>
+</file>
+
+<file path=ppt/slides/slide26.xml><?xml version="1.0" encoding="utf-8"?>
 <p:sld xmlns:a="http://schemas.openxmlformats.org/drawingml/2006/main" xmlns:r="http://schemas.openxmlformats.org/officeDocument/2006/relationships" xmlns:p="http://schemas.openxmlformats.org/presentationml/2006/main">
   <p:cSld>
     <p:spTree>

</xml_diff>